<commit_message>
swift content added and modified existing content
</commit_message>
<xml_diff>
--- a/media/esx/Beta1-ESX-Network-Diagram.pptx
+++ b/media/esx/Beta1-ESX-Network-Diagram.pptx
@@ -243,7 +243,7 @@
           <a:p>
             <a:fld id="{A0A89A47-19E5-46D7-88C7-ADFED4B6EDFB}" type="datetimeFigureOut">
               <a:rPr lang="en-US" smtClean="0"/>
-              <a:t>8/31/2015</a:t>
+              <a:t>10/6/2015</a:t>
             </a:fld>
             <a:endParaRPr lang="en-US" dirty="0"/>
           </a:p>
@@ -413,7 +413,7 @@
           <a:p>
             <a:fld id="{A0A89A47-19E5-46D7-88C7-ADFED4B6EDFB}" type="datetimeFigureOut">
               <a:rPr lang="en-US" smtClean="0"/>
-              <a:t>8/31/2015</a:t>
+              <a:t>10/6/2015</a:t>
             </a:fld>
             <a:endParaRPr lang="en-US" dirty="0"/>
           </a:p>
@@ -593,7 +593,7 @@
           <a:p>
             <a:fld id="{A0A89A47-19E5-46D7-88C7-ADFED4B6EDFB}" type="datetimeFigureOut">
               <a:rPr lang="en-US" smtClean="0"/>
-              <a:t>8/31/2015</a:t>
+              <a:t>10/6/2015</a:t>
             </a:fld>
             <a:endParaRPr lang="en-US" dirty="0"/>
           </a:p>
@@ -763,7 +763,7 @@
           <a:p>
             <a:fld id="{A0A89A47-19E5-46D7-88C7-ADFED4B6EDFB}" type="datetimeFigureOut">
               <a:rPr lang="en-US" smtClean="0"/>
-              <a:t>8/31/2015</a:t>
+              <a:t>10/6/2015</a:t>
             </a:fld>
             <a:endParaRPr lang="en-US" dirty="0"/>
           </a:p>
@@ -1009,7 +1009,7 @@
           <a:p>
             <a:fld id="{A0A89A47-19E5-46D7-88C7-ADFED4B6EDFB}" type="datetimeFigureOut">
               <a:rPr lang="en-US" smtClean="0"/>
-              <a:t>8/31/2015</a:t>
+              <a:t>10/6/2015</a:t>
             </a:fld>
             <a:endParaRPr lang="en-US" dirty="0"/>
           </a:p>
@@ -1241,7 +1241,7 @@
           <a:p>
             <a:fld id="{A0A89A47-19E5-46D7-88C7-ADFED4B6EDFB}" type="datetimeFigureOut">
               <a:rPr lang="en-US" smtClean="0"/>
-              <a:t>8/31/2015</a:t>
+              <a:t>10/6/2015</a:t>
             </a:fld>
             <a:endParaRPr lang="en-US" dirty="0"/>
           </a:p>
@@ -1608,7 +1608,7 @@
           <a:p>
             <a:fld id="{A0A89A47-19E5-46D7-88C7-ADFED4B6EDFB}" type="datetimeFigureOut">
               <a:rPr lang="en-US" smtClean="0"/>
-              <a:t>8/31/2015</a:t>
+              <a:t>10/6/2015</a:t>
             </a:fld>
             <a:endParaRPr lang="en-US" dirty="0"/>
           </a:p>
@@ -1726,7 +1726,7 @@
           <a:p>
             <a:fld id="{A0A89A47-19E5-46D7-88C7-ADFED4B6EDFB}" type="datetimeFigureOut">
               <a:rPr lang="en-US" smtClean="0"/>
-              <a:t>8/31/2015</a:t>
+              <a:t>10/6/2015</a:t>
             </a:fld>
             <a:endParaRPr lang="en-US" dirty="0"/>
           </a:p>
@@ -1821,7 +1821,7 @@
           <a:p>
             <a:fld id="{A0A89A47-19E5-46D7-88C7-ADFED4B6EDFB}" type="datetimeFigureOut">
               <a:rPr lang="en-US" smtClean="0"/>
-              <a:t>8/31/2015</a:t>
+              <a:t>10/6/2015</a:t>
             </a:fld>
             <a:endParaRPr lang="en-US" dirty="0"/>
           </a:p>
@@ -2098,7 +2098,7 @@
           <a:p>
             <a:fld id="{A0A89A47-19E5-46D7-88C7-ADFED4B6EDFB}" type="datetimeFigureOut">
               <a:rPr lang="en-US" smtClean="0"/>
-              <a:t>8/31/2015</a:t>
+              <a:t>10/6/2015</a:t>
             </a:fld>
             <a:endParaRPr lang="en-US" dirty="0"/>
           </a:p>
@@ -2351,7 +2351,7 @@
           <a:p>
             <a:fld id="{A0A89A47-19E5-46D7-88C7-ADFED4B6EDFB}" type="datetimeFigureOut">
               <a:rPr lang="en-US" smtClean="0"/>
-              <a:t>8/31/2015</a:t>
+              <a:t>10/6/2015</a:t>
             </a:fld>
             <a:endParaRPr lang="en-US" dirty="0"/>
           </a:p>
@@ -2564,7 +2564,7 @@
           <a:p>
             <a:fld id="{A0A89A47-19E5-46D7-88C7-ADFED4B6EDFB}" type="datetimeFigureOut">
               <a:rPr lang="en-US" smtClean="0"/>
-              <a:t>8/31/2015</a:t>
+              <a:t>10/6/2015</a:t>
             </a:fld>
             <a:endParaRPr lang="en-US" dirty="0"/>
           </a:p>
@@ -5667,11 +5667,7 @@
             </a:pPr>
             <a:r>
               <a:rPr lang="en-US" sz="1000" b="1" i="1" dirty="0" smtClean="0"/>
-              <a:t>EXTERNAL_API </a:t>
-            </a:r>
-            <a:r>
-              <a:rPr lang="en-US" sz="1000" b="1" i="1" dirty="0" smtClean="0"/>
-              <a:t>must be reachable</a:t>
+              <a:t>EXTERNAL_API must be reachable</a:t>
             </a:r>
           </a:p>
           <a:p>
@@ -5735,11 +5731,7 @@
             </a:r>
             <a:r>
               <a:rPr lang="en-US" sz="1000" b="1" i="1" dirty="0" smtClean="0"/>
-              <a:t> network used by Cloud Controllers (and other Cobbler driven elements).  Customer should hav</a:t>
-            </a:r>
-            <a:r>
-              <a:rPr lang="en-US" sz="1000" b="1" i="1" dirty="0" smtClean="0"/>
-              <a:t>e a router to route across these two </a:t>
+              <a:t> network used by Cloud Controllers (and other Cobbler driven elements).  Customer should have a router to route across these two </a:t>
             </a:r>
             <a:r>
               <a:rPr lang="en-US" sz="1000" b="1" i="1" dirty="0" err="1" smtClean="0"/>
@@ -5782,7 +5774,6 @@
               <a:rPr lang="en-US" sz="1000" b="1" i="1" dirty="0" smtClean="0"/>
               <a:t> need Datacenter Management Network (DCM) connectivity.  So please ensure DCM must be reachable from Cloud MGMT network.</a:t>
             </a:r>
-            <a:endParaRPr lang="en-US" sz="1000" b="1" i="1" dirty="0" smtClean="0"/>
           </a:p>
           <a:p>
             <a:endParaRPr lang="en-US" sz="1200" b="1" i="1" dirty="0"/>

</xml_diff>